<commit_message>
ISIT422 HW-1 Team facts
</commit_message>
<xml_diff>
--- a/001 - Into_  Teams and Linux/Teams.pptx
+++ b/001 - Into_  Teams and Linux/Teams.pptx
@@ -3402,7 +3402,7 @@
         </p:spPr>
         <p:txBody>
           <a:bodyPr>
-            <a:normAutofit fontScale="92500"/>
+            <a:normAutofit/>
           </a:bodyPr>
           <a:lstStyle/>
           <a:p>
@@ -3550,53 +3550,20 @@
           </a:p>
           <a:p>
             <a:r>
-              <a:rPr lang="en-US" sz="1600" dirty="0"/>
-              <a:t>How important </a:t>
-            </a:r>
-            <a:r>
               <a:rPr lang="en-US" sz="1600" dirty="0" smtClean="0"/>
-              <a:t>do you </a:t>
-            </a:r>
-            <a:r>
-              <a:rPr lang="en-US" sz="1600" dirty="0"/>
-              <a:t>feel it is that team members show up on time for class and meetings</a:t>
+              <a:t>Is </a:t>
             </a:r>
             <a:r>
               <a:rPr lang="en-US" sz="1600" dirty="0" smtClean="0"/>
-              <a:t>.</a:t>
-            </a:r>
-          </a:p>
-          <a:p>
-            <a:pPr lvl="1"/>
-            <a:r>
-              <a:rPr lang="en-US" sz="1600" b="1" dirty="0" smtClean="0"/>
-              <a:t>0</a:t>
+              <a:t>a B grade good enough for you? </a:t>
+            </a:r>
+            <a:r>
+              <a:rPr lang="en-US" sz="1600" smtClean="0"/>
+              <a:t>a </a:t>
             </a:r>
             <a:r>
               <a:rPr lang="en-US" sz="1600" dirty="0" smtClean="0"/>
-              <a:t> not a big deal, </a:t>
-            </a:r>
-            <a:r>
-              <a:rPr lang="en-US" sz="1600" b="1" dirty="0" smtClean="0"/>
-              <a:t>1</a:t>
-            </a:r>
-            <a:r>
-              <a:rPr lang="en-US" sz="1600" dirty="0" smtClean="0"/>
-              <a:t> important, </a:t>
-            </a:r>
-            <a:r>
-              <a:rPr lang="en-US" sz="1600" b="1" dirty="0" smtClean="0"/>
-              <a:t>2</a:t>
-            </a:r>
-            <a:r>
-              <a:rPr lang="en-US" sz="1600" dirty="0" smtClean="0"/>
-              <a:t> an absolute requirement</a:t>
-            </a:r>
-          </a:p>
-          <a:p>
-            <a:r>
-              <a:rPr lang="en-US" sz="1600" dirty="0" smtClean="0"/>
-              <a:t>Is a B grade good enough for you? A C? Must you get an A?  Why?</a:t>
+              <a:t>C? Must you get an A?  Why?</a:t>
             </a:r>
             <a:endParaRPr lang="en-US" sz="1600" dirty="0"/>
           </a:p>
@@ -5696,11 +5663,7 @@
           <a:p>
             <a:r>
               <a:rPr lang="en-US" sz="1600" dirty="0" smtClean="0"/>
-              <a:t>Is </a:t>
-            </a:r>
-            <a:r>
-              <a:rPr lang="en-US" sz="1600" dirty="0" smtClean="0"/>
-              <a:t>a B grade good enough for you? </a:t>
+              <a:t>Is a B grade good enough for you? </a:t>
             </a:r>
             <a:r>
               <a:rPr lang="en-US" sz="1600" smtClean="0"/>

</xml_diff>